<commit_message>
Docs update on Pre-Requistes
Update pre-requisites and add them to the install guide too.
</commit_message>
<xml_diff>
--- a/Docs/RA-Overview.pptx
+++ b/Docs/RA-Overview.pptx
@@ -146,8 +146,8 @@
 <pc:chgInfo xmlns:a="http://schemas.openxmlformats.org/drawingml/2006/main" xmlns:r="http://schemas.openxmlformats.org/officeDocument/2006/relationships" xmlns:ac="http://schemas.microsoft.com/office/drawing/2013/main/command" xmlns:pc="http://schemas.microsoft.com/office/powerpoint/2013/main/command">
   <pc:docChgLst>
     <pc:chgData name="Nicolas Kirrmann" userId="82063de6-9c6f-4790-b8fa-98feff280277" providerId="ADAL" clId="{69C4B95F-EFC9-4E06-B82B-CA39EADB1E80}"/>
-    <pc:docChg chg="delSld sldOrd delSection modSection">
-      <pc:chgData name="Nicolas Kirrmann" userId="82063de6-9c6f-4790-b8fa-98feff280277" providerId="ADAL" clId="{69C4B95F-EFC9-4E06-B82B-CA39EADB1E80}" dt="2023-10-12T12:05:14.571" v="10" actId="47"/>
+    <pc:docChg chg="custSel delSld modSld sldOrd delSection modSection">
+      <pc:chgData name="Nicolas Kirrmann" userId="82063de6-9c6f-4790-b8fa-98feff280277" providerId="ADAL" clId="{69C4B95F-EFC9-4E06-B82B-CA39EADB1E80}" dt="2023-10-19T06:56:42.293" v="101" actId="20577"/>
       <pc:docMkLst>
         <pc:docMk/>
       </pc:docMkLst>
@@ -157,6 +157,21 @@
           <pc:docMk/>
           <pc:sldMk cId="2935544358" sldId="2147478729"/>
         </pc:sldMkLst>
+      </pc:sldChg>
+      <pc:sldChg chg="modSp mod">
+        <pc:chgData name="Nicolas Kirrmann" userId="82063de6-9c6f-4790-b8fa-98feff280277" providerId="ADAL" clId="{69C4B95F-EFC9-4E06-B82B-CA39EADB1E80}" dt="2023-10-19T06:56:42.293" v="101" actId="20577"/>
+        <pc:sldMkLst>
+          <pc:docMk/>
+          <pc:sldMk cId="4260377684" sldId="2147478772"/>
+        </pc:sldMkLst>
+        <pc:spChg chg="mod">
+          <ac:chgData name="Nicolas Kirrmann" userId="82063de6-9c6f-4790-b8fa-98feff280277" providerId="ADAL" clId="{69C4B95F-EFC9-4E06-B82B-CA39EADB1E80}" dt="2023-10-19T06:56:42.293" v="101" actId="20577"/>
+          <ac:spMkLst>
+            <pc:docMk/>
+            <pc:sldMk cId="4260377684" sldId="2147478772"/>
+            <ac:spMk id="6" creationId="{4DCE1FE4-805F-EFEF-98C6-A0DFB77D60E8}"/>
+          </ac:spMkLst>
+        </pc:spChg>
       </pc:sldChg>
       <pc:sldChg chg="del">
         <pc:chgData name="Nicolas Kirrmann" userId="82063de6-9c6f-4790-b8fa-98feff280277" providerId="ADAL" clId="{69C4B95F-EFC9-4E06-B82B-CA39EADB1E80}" dt="2023-10-12T12:04:35.098" v="0" actId="2696"/>
@@ -3414,7 +3429,7 @@
           <a:p>
             <a:fld id="{75EDFE92-48B5-4321-930D-D4E4AEB6B910}" type="datetimeFigureOut">
               <a:rPr lang="en-GB" smtClean="0"/>
-              <a:t>12/10/2023</a:t>
+              <a:t>19/10/2023</a:t>
             </a:fld>
             <a:endParaRPr lang="en-GB"/>
           </a:p>
@@ -4486,7 +4501,7 @@
           <a:p>
             <a:fld id="{E99DF397-30FC-4E38-9C16-8682FB34773D}" type="datetime1">
               <a:rPr lang="en-GB" smtClean="0"/>
-              <a:t>12/10/2023</a:t>
+              <a:t>19/10/2023</a:t>
             </a:fld>
             <a:endParaRPr lang="en-GB"/>
           </a:p>
@@ -4654,7 +4669,7 @@
           <a:p>
             <a:fld id="{4775BEEB-572D-4CEA-AA7D-A1A52BEF88E5}" type="datetime1">
               <a:rPr lang="en-GB" smtClean="0"/>
-              <a:t>12/10/2023</a:t>
+              <a:t>19/10/2023</a:t>
             </a:fld>
             <a:endParaRPr lang="en-GB"/>
           </a:p>
@@ -4832,7 +4847,7 @@
           <a:p>
             <a:fld id="{AD80C97A-A3BD-4951-8115-7851477C6286}" type="datetime1">
               <a:rPr lang="en-GB" smtClean="0"/>
-              <a:t>12/10/2023</a:t>
+              <a:t>19/10/2023</a:t>
             </a:fld>
             <a:endParaRPr lang="en-GB"/>
           </a:p>
@@ -5000,7 +5015,7 @@
           <a:p>
             <a:fld id="{E8D6B988-EB24-4F13-AA2F-DF6BABE54D73}" type="datetime1">
               <a:rPr lang="en-GB" smtClean="0"/>
-              <a:t>12/10/2023</a:t>
+              <a:t>19/10/2023</a:t>
             </a:fld>
             <a:endParaRPr lang="en-GB"/>
           </a:p>
@@ -5245,7 +5260,7 @@
           <a:p>
             <a:fld id="{4EB9F35B-8F38-4D9B-B2F6-0E2453AEACBA}" type="datetime1">
               <a:rPr lang="en-GB" smtClean="0"/>
-              <a:t>12/10/2023</a:t>
+              <a:t>19/10/2023</a:t>
             </a:fld>
             <a:endParaRPr lang="en-GB"/>
           </a:p>
@@ -5474,7 +5489,7 @@
           <a:p>
             <a:fld id="{6D66A7D8-AEFA-4832-8D4C-9B812E6298C1}" type="datetime1">
               <a:rPr lang="en-GB" smtClean="0"/>
-              <a:t>12/10/2023</a:t>
+              <a:t>19/10/2023</a:t>
             </a:fld>
             <a:endParaRPr lang="en-GB"/>
           </a:p>
@@ -5838,7 +5853,7 @@
           <a:p>
             <a:fld id="{C00B5C87-3B8E-47D3-B1FD-20AE58AEA901}" type="datetime1">
               <a:rPr lang="en-GB" smtClean="0"/>
-              <a:t>12/10/2023</a:t>
+              <a:t>19/10/2023</a:t>
             </a:fld>
             <a:endParaRPr lang="en-GB"/>
           </a:p>
@@ -5955,7 +5970,7 @@
           <a:p>
             <a:fld id="{EF958735-133D-4A9C-BC39-501D5B9AB523}" type="datetime1">
               <a:rPr lang="en-GB" smtClean="0"/>
-              <a:t>12/10/2023</a:t>
+              <a:t>19/10/2023</a:t>
             </a:fld>
             <a:endParaRPr lang="en-GB"/>
           </a:p>
@@ -6050,7 +6065,7 @@
           <a:p>
             <a:fld id="{35CF3542-0655-4F9A-A6D2-CF6F95B3FF16}" type="datetime1">
               <a:rPr lang="en-GB" smtClean="0"/>
-              <a:t>12/10/2023</a:t>
+              <a:t>19/10/2023</a:t>
             </a:fld>
             <a:endParaRPr lang="en-GB"/>
           </a:p>
@@ -6325,7 +6340,7 @@
           <a:p>
             <a:fld id="{C35A84DD-669C-45F9-88E5-0D5CC14F0E78}" type="datetime1">
               <a:rPr lang="en-GB" smtClean="0"/>
-              <a:t>12/10/2023</a:t>
+              <a:t>19/10/2023</a:t>
             </a:fld>
             <a:endParaRPr lang="en-GB"/>
           </a:p>
@@ -6580,7 +6595,7 @@
           <a:p>
             <a:fld id="{99672BCC-3E51-46D4-8C36-2AE7A75829B6}" type="datetime1">
               <a:rPr lang="en-GB" smtClean="0"/>
-              <a:t>12/10/2023</a:t>
+              <a:t>19/10/2023</a:t>
             </a:fld>
             <a:endParaRPr lang="en-GB"/>
           </a:p>
@@ -6791,7 +6806,7 @@
           <a:p>
             <a:fld id="{7C83D117-2477-4F0F-BA83-180A9B76E706}" type="datetime1">
               <a:rPr lang="en-GB" smtClean="0"/>
-              <a:t>12/10/2023</a:t>
+              <a:t>19/10/2023</a:t>
             </a:fld>
             <a:endParaRPr lang="en-GB"/>
           </a:p>
@@ -13010,7 +13025,7 @@
         <p:spPr>
           <a:xfrm>
             <a:off x="8764197" y="1795246"/>
-            <a:ext cx="2895600" cy="2308324"/>
+            <a:ext cx="2895600" cy="3416320"/>
           </a:xfrm>
           <a:prstGeom prst="rect">
             <a:avLst/>
@@ -13059,8 +13074,13 @@
             </a:pPr>
             <a:r>
               <a:rPr lang="en-GB" dirty="0"/>
-              <a:t>HTTP with A</a:t>
-            </a:r>
+              <a:t>HTTP with AD Connector allowed in the environment where the Request Analyzer </a:t>
+            </a:r>
+            <a:r>
+              <a:rPr lang="en-GB"/>
+              <a:t>is installed</a:t>
+            </a:r>
+            <a:endParaRPr lang="en-GB" dirty="0"/>
           </a:p>
         </p:txBody>
       </p:sp>
@@ -13640,11 +13660,7 @@
 
 <file path=customXml/item1.xml><?xml version="1.0" encoding="utf-8"?>
 <?mso-contentType ?>
-<FormTemplates xmlns="http://schemas.microsoft.com/sharepoint/v3/contenttype/forms">
-  <Display>DocumentLibraryForm</Display>
-  <Edit>DocumentLibraryForm</Edit>
-  <New>DocumentLibraryForm</New>
-</FormTemplates>
+<SharedContentType xmlns="Microsoft.SharePoint.Taxonomy.ContentTypeSync" SourceId="c52eb4dc-0ef3-4aa8-8e03-025dbf6c8637" ContentTypeId="0x0101" PreviousValue="false"/>
 </file>
 
 <file path=customXml/item2.xml><?xml version="1.0" encoding="utf-8"?>
@@ -13872,7 +13888,11 @@
 
 <file path=customXml/item3.xml><?xml version="1.0" encoding="utf-8"?>
 <?mso-contentType ?>
-<SharedContentType xmlns="Microsoft.SharePoint.Taxonomy.ContentTypeSync" SourceId="c52eb4dc-0ef3-4aa8-8e03-025dbf6c8637" ContentTypeId="0x0101" PreviousValue="false"/>
+<FormTemplates xmlns="http://schemas.microsoft.com/sharepoint/v3/contenttype/forms">
+  <Display>DocumentLibraryForm</Display>
+  <Edit>DocumentLibraryForm</Edit>
+  <New>DocumentLibraryForm</New>
+</FormTemplates>
 </file>
 
 <file path=customXml/item4.xml><?xml version="1.0" encoding="utf-8"?>
@@ -13887,9 +13907,9 @@
 </file>
 
 <file path=customXml/itemProps1.xml><?xml version="1.0" encoding="utf-8"?>
-<ds:datastoreItem xmlns:ds="http://schemas.openxmlformats.org/officeDocument/2006/customXml" ds:itemID="{E60E9F8E-754E-44A6-9EA6-237068D4443B}">
+<ds:datastoreItem xmlns:ds="http://schemas.openxmlformats.org/officeDocument/2006/customXml" ds:itemID="{0A62DCFB-4A3A-408B-B09C-A9594B58278F}">
   <ds:schemaRefs>
-    <ds:schemaRef ds:uri="http://schemas.microsoft.com/sharepoint/v3/contenttype/forms"/>
+    <ds:schemaRef ds:uri="Microsoft.SharePoint.Taxonomy.ContentTypeSync"/>
   </ds:schemaRefs>
 </ds:datastoreItem>
 </file>
@@ -13914,9 +13934,9 @@
 </file>
 
 <file path=customXml/itemProps3.xml><?xml version="1.0" encoding="utf-8"?>
-<ds:datastoreItem xmlns:ds="http://schemas.openxmlformats.org/officeDocument/2006/customXml" ds:itemID="{0A62DCFB-4A3A-408B-B09C-A9594B58278F}">
+<ds:datastoreItem xmlns:ds="http://schemas.openxmlformats.org/officeDocument/2006/customXml" ds:itemID="{E60E9F8E-754E-44A6-9EA6-237068D4443B}">
   <ds:schemaRefs>
-    <ds:schemaRef ds:uri="Microsoft.SharePoint.Taxonomy.ContentTypeSync"/>
+    <ds:schemaRef ds:uri="http://schemas.microsoft.com/sharepoint/v3/contenttype/forms"/>
   </ds:schemaRefs>
 </ds:datastoreItem>
 </file>

</xml_diff>